<commit_message>
Imagen arqui presentación calida
</commit_message>
<xml_diff>
--- a/docs/Presentación Sistemas Web.pptx
+++ b/docs/Presentación Sistemas Web.pptx
@@ -125,6 +125,7 @@
     <p1510:client id="{2876FE25-75C9-3FBE-7662-D5F9112E4B4B}" v="1" dt="2024-12-10T14:08:02.329"/>
     <p1510:client id="{4105BF3B-5CAE-ACC6-AED8-EAFB5AA2CCF6}" v="88" dt="2024-12-10T14:11:26.897"/>
     <p1510:client id="{543DD4D3-96B8-0FE4-1C6A-374A23BEF539}" v="453" dt="2024-12-10T14:12:16.109"/>
+    <p1510:client id="{BF3FA9EA-3923-158B-C4D6-F8EF5391B28D}" v="6" dt="2024-12-10T16:04:26.579"/>
     <p1510:client id="{CA8EADDE-A85B-F006-C21B-27586B0142FF}" v="520" dt="2024-12-10T14:05:07.731"/>
   </p1510:revLst>
 </p1510:revInfo>
@@ -6629,35 +6630,6 @@
           </a:p>
         </p:txBody>
       </p:sp>
-      <p:pic>
-        <p:nvPicPr>
-          <p:cNvPr id="7" name="Marcador de contenido 6">
-            <a:extLst>
-              <a:ext uri="{FF2B5EF4-FFF2-40B4-BE49-F238E27FC236}">
-                <a16:creationId xmlns:a16="http://schemas.microsoft.com/office/drawing/2014/main" id="{028C88A5-44B9-DE2C-6846-3DDD5F178CE5}"/>
-              </a:ext>
-            </a:extLst>
-          </p:cNvPr>
-          <p:cNvPicPr>
-            <a:picLocks noGrp="1" noChangeAspect="1"/>
-          </p:cNvPicPr>
-          <p:nvPr>
-            <p:ph idx="1"/>
-          </p:nvPr>
-        </p:nvPicPr>
-        <p:blipFill>
-          <a:blip r:embed="rId2"/>
-          <a:stretch>
-            <a:fillRect/>
-          </a:stretch>
-        </p:blipFill>
-        <p:spPr>
-          <a:xfrm>
-            <a:off x="1428879" y="1619015"/>
-            <a:ext cx="9797620" cy="4919018"/>
-          </a:xfrm>
-        </p:spPr>
-      </p:pic>
       <p:sp>
         <p:nvSpPr>
           <p:cNvPr id="4" name="Marcador de número de diapositiva 3">
@@ -6702,11 +6674,11 @@
           <p:nvPr/>
         </p:nvPicPr>
         <p:blipFill>
-          <a:blip r:embed="rId3">
+          <a:blip r:embed="rId2">
             <a:extLst>
               <a:ext uri="{BEBA8EAE-BF5A-486C-A8C5-ECC9F3942E4B}">
                 <a14:imgProps xmlns:a14="http://schemas.microsoft.com/office/drawing/2010/main">
-                  <a14:imgLayer r:embed="rId4">
+                  <a14:imgLayer r:embed="rId3">
                     <a14:imgEffect>
                       <a14:backgroundRemoval t="10000" b="90000" l="10000" r="90000"/>
                     </a14:imgEffect>
@@ -6727,6 +6699,35 @@
           <a:prstGeom prst="rect">
             <a:avLst/>
           </a:prstGeom>
+        </p:spPr>
+      </p:pic>
+      <p:pic>
+        <p:nvPicPr>
+          <p:cNvPr id="8" name="Marcador de contenido 7" descr="Diagrama&#10;&#10;Descripción generada automáticamente">
+            <a:extLst>
+              <a:ext uri="{FF2B5EF4-FFF2-40B4-BE49-F238E27FC236}">
+                <a16:creationId xmlns:a16="http://schemas.microsoft.com/office/drawing/2014/main" id="{B8A93D60-16CA-33E0-E842-AEA19A01EDA4}"/>
+              </a:ext>
+            </a:extLst>
+          </p:cNvPr>
+          <p:cNvPicPr>
+            <a:picLocks noGrp="1" noChangeAspect="1"/>
+          </p:cNvPicPr>
+          <p:nvPr>
+            <p:ph idx="1"/>
+          </p:nvPr>
+        </p:nvPicPr>
+        <p:blipFill>
+          <a:blip r:embed="rId4"/>
+          <a:stretch>
+            <a:fillRect/>
+          </a:stretch>
+        </p:blipFill>
+        <p:spPr>
+          <a:xfrm>
+            <a:off x="1044707" y="1535270"/>
+            <a:ext cx="10092324" cy="5087915"/>
+          </a:xfrm>
         </p:spPr>
       </p:pic>
     </p:spTree>

</xml_diff>